<commit_message>
Chap03: Pictures and caption done.
</commit_message>
<xml_diff>
--- a/03-h-Mn/Pictures/DotPres.pptx
+++ b/03-h-Mn/Pictures/DotPres.pptx
@@ -10,7 +10,7 @@
   <p:sldIdLst>
     <p:sldId id="293" r:id="rId2"/>
   </p:sldIdLst>
-  <p:sldSz cx="5868988" cy="6229350"/>
+  <p:sldSz cx="5868988" cy="6372225"/>
   <p:notesSz cx="6797675" cy="9926638"/>
   <p:defaultTextStyle>
     <a:defPPr>
@@ -192,7 +192,7 @@
           <a:p>
             <a:fld id="{A732596A-CC33-44AB-A517-CD91BCF05E15}" type="datetimeFigureOut">
               <a:rPr lang="en-US" smtClean="0"/>
-              <a:t>7/11/2017</a:t>
+              <a:t>7/12/2017</a:t>
             </a:fld>
             <a:endParaRPr lang="en-US"/>
           </a:p>
@@ -210,8 +210,8 @@
         </p:nvSpPr>
         <p:spPr>
           <a:xfrm>
-            <a:off x="1646238" y="744538"/>
-            <a:ext cx="3505200" cy="3721100"/>
+            <a:off x="1685925" y="744538"/>
+            <a:ext cx="3425825" cy="3721100"/>
           </a:xfrm>
           <a:prstGeom prst="rect">
             <a:avLst/>
@@ -489,8 +489,8 @@
         </p:nvSpPr>
         <p:spPr>
           <a:xfrm>
-            <a:off x="1646238" y="744538"/>
-            <a:ext cx="3505200" cy="3721100"/>
+            <a:off x="1685925" y="744538"/>
+            <a:ext cx="3425825" cy="3721100"/>
           </a:xfrm>
         </p:spPr>
       </p:sp>
@@ -578,8 +578,8 @@
         </p:nvSpPr>
         <p:spPr>
           <a:xfrm>
-            <a:off x="440178" y="1935139"/>
-            <a:ext cx="4988639" cy="1335273"/>
+            <a:off x="440180" y="1979523"/>
+            <a:ext cx="4988639" cy="1365899"/>
           </a:xfrm>
         </p:spPr>
         <p:txBody>
@@ -606,8 +606,8 @@
         </p:nvSpPr>
         <p:spPr>
           <a:xfrm>
-            <a:off x="880350" y="3529967"/>
-            <a:ext cx="4108292" cy="1591945"/>
+            <a:off x="880350" y="3610931"/>
+            <a:ext cx="4108292" cy="1628458"/>
           </a:xfrm>
         </p:spPr>
         <p:txBody>
@@ -730,7 +730,7 @@
           <a:p>
             <a:fld id="{252CF840-51FB-49D9-ADDC-0C52DA34DC77}" type="datetimeFigureOut">
               <a:rPr lang="en-US" smtClean="0"/>
-              <a:t>7/11/2017</a:t>
+              <a:t>7/12/2017</a:t>
             </a:fld>
             <a:endParaRPr lang="en-US"/>
           </a:p>
@@ -900,7 +900,7 @@
           <a:p>
             <a:fld id="{252CF840-51FB-49D9-ADDC-0C52DA34DC77}" type="datetimeFigureOut">
               <a:rPr lang="en-US" smtClean="0"/>
-              <a:t>7/11/2017</a:t>
+              <a:t>7/12/2017</a:t>
             </a:fld>
             <a:endParaRPr lang="en-US"/>
           </a:p>
@@ -990,8 +990,8 @@
         </p:nvSpPr>
         <p:spPr>
           <a:xfrm>
-            <a:off x="4255018" y="249468"/>
-            <a:ext cx="1320522" cy="5315134"/>
+            <a:off x="4255018" y="255190"/>
+            <a:ext cx="1320522" cy="5437041"/>
           </a:xfrm>
         </p:spPr>
         <p:txBody>
@@ -1018,8 +1018,8 @@
         </p:nvSpPr>
         <p:spPr>
           <a:xfrm>
-            <a:off x="293453" y="249468"/>
-            <a:ext cx="3863751" cy="5315134"/>
+            <a:off x="293455" y="255190"/>
+            <a:ext cx="3863751" cy="5437041"/>
           </a:xfrm>
         </p:spPr>
         <p:txBody>
@@ -1080,7 +1080,7 @@
           <a:p>
             <a:fld id="{252CF840-51FB-49D9-ADDC-0C52DA34DC77}" type="datetimeFigureOut">
               <a:rPr lang="en-US" smtClean="0"/>
-              <a:t>7/11/2017</a:t>
+              <a:t>7/12/2017</a:t>
             </a:fld>
             <a:endParaRPr lang="en-US"/>
           </a:p>
@@ -1250,7 +1250,7 @@
           <a:p>
             <a:fld id="{252CF840-51FB-49D9-ADDC-0C52DA34DC77}" type="datetimeFigureOut">
               <a:rPr lang="en-US" smtClean="0"/>
-              <a:t>7/11/2017</a:t>
+              <a:t>7/12/2017</a:t>
             </a:fld>
             <a:endParaRPr lang="en-US"/>
           </a:p>
@@ -1340,8 +1340,8 @@
         </p:nvSpPr>
         <p:spPr>
           <a:xfrm>
-            <a:off x="463612" y="4002936"/>
-            <a:ext cx="4988639" cy="1237218"/>
+            <a:off x="463612" y="4094747"/>
+            <a:ext cx="4988639" cy="1265595"/>
           </a:xfrm>
         </p:spPr>
         <p:txBody>
@@ -1372,8 +1372,8 @@
         </p:nvSpPr>
         <p:spPr>
           <a:xfrm>
-            <a:off x="463612" y="2640268"/>
-            <a:ext cx="4988639" cy="1362670"/>
+            <a:off x="463612" y="2700824"/>
+            <a:ext cx="4988639" cy="1393924"/>
           </a:xfrm>
         </p:spPr>
         <p:txBody>
@@ -1496,7 +1496,7 @@
           <a:p>
             <a:fld id="{252CF840-51FB-49D9-ADDC-0C52DA34DC77}" type="datetimeFigureOut">
               <a:rPr lang="en-US" smtClean="0"/>
-              <a:t>7/11/2017</a:t>
+              <a:t>7/12/2017</a:t>
             </a:fld>
             <a:endParaRPr lang="en-US"/>
           </a:p>
@@ -1609,8 +1609,8 @@
         </p:nvSpPr>
         <p:spPr>
           <a:xfrm>
-            <a:off x="293453" y="1453521"/>
-            <a:ext cx="2592137" cy="4111083"/>
+            <a:off x="293455" y="1486860"/>
+            <a:ext cx="2592137" cy="4205374"/>
           </a:xfrm>
         </p:spPr>
         <p:txBody>
@@ -1694,8 +1694,8 @@
         </p:nvSpPr>
         <p:spPr>
           <a:xfrm>
-            <a:off x="2983405" y="1453521"/>
-            <a:ext cx="2592137" cy="4111083"/>
+            <a:off x="2983407" y="1486860"/>
+            <a:ext cx="2592137" cy="4205374"/>
           </a:xfrm>
         </p:spPr>
         <p:txBody>
@@ -1784,7 +1784,7 @@
           <a:p>
             <a:fld id="{252CF840-51FB-49D9-ADDC-0C52DA34DC77}" type="datetimeFigureOut">
               <a:rPr lang="en-US" smtClean="0"/>
-              <a:t>7/11/2017</a:t>
+              <a:t>7/12/2017</a:t>
             </a:fld>
             <a:endParaRPr lang="en-US"/>
           </a:p>
@@ -1901,8 +1901,8 @@
         </p:nvSpPr>
         <p:spPr>
           <a:xfrm>
-            <a:off x="293450" y="1394395"/>
-            <a:ext cx="2593157" cy="581118"/>
+            <a:off x="293450" y="1426376"/>
+            <a:ext cx="2593157" cy="594447"/>
           </a:xfrm>
         </p:spPr>
         <p:txBody>
@@ -1966,8 +1966,8 @@
         </p:nvSpPr>
         <p:spPr>
           <a:xfrm>
-            <a:off x="293450" y="1975512"/>
-            <a:ext cx="2593157" cy="3589086"/>
+            <a:off x="293450" y="2020822"/>
+            <a:ext cx="2593157" cy="3671405"/>
           </a:xfrm>
         </p:spPr>
         <p:txBody>
@@ -2051,8 +2051,8 @@
         </p:nvSpPr>
         <p:spPr>
           <a:xfrm>
-            <a:off x="2981368" y="1394395"/>
-            <a:ext cx="2594174" cy="581118"/>
+            <a:off x="2981368" y="1426376"/>
+            <a:ext cx="2594174" cy="594447"/>
           </a:xfrm>
         </p:spPr>
         <p:txBody>
@@ -2116,8 +2116,8 @@
         </p:nvSpPr>
         <p:spPr>
           <a:xfrm>
-            <a:off x="2981368" y="1975512"/>
-            <a:ext cx="2594174" cy="3589086"/>
+            <a:off x="2981368" y="2020822"/>
+            <a:ext cx="2594174" cy="3671405"/>
           </a:xfrm>
         </p:spPr>
         <p:txBody>
@@ -2206,7 +2206,7 @@
           <a:p>
             <a:fld id="{252CF840-51FB-49D9-ADDC-0C52DA34DC77}" type="datetimeFigureOut">
               <a:rPr lang="en-US" smtClean="0"/>
-              <a:t>7/11/2017</a:t>
+              <a:t>7/12/2017</a:t>
             </a:fld>
             <a:endParaRPr lang="en-US"/>
           </a:p>
@@ -2324,7 +2324,7 @@
           <a:p>
             <a:fld id="{252CF840-51FB-49D9-ADDC-0C52DA34DC77}" type="datetimeFigureOut">
               <a:rPr lang="en-US" smtClean="0"/>
-              <a:t>7/11/2017</a:t>
+              <a:t>7/12/2017</a:t>
             </a:fld>
             <a:endParaRPr lang="en-US"/>
           </a:p>
@@ -2419,7 +2419,7 @@
           <a:p>
             <a:fld id="{252CF840-51FB-49D9-ADDC-0C52DA34DC77}" type="datetimeFigureOut">
               <a:rPr lang="en-US" smtClean="0"/>
-              <a:t>7/11/2017</a:t>
+              <a:t>7/12/2017</a:t>
             </a:fld>
             <a:endParaRPr lang="en-US"/>
           </a:p>
@@ -2509,8 +2509,8 @@
         </p:nvSpPr>
         <p:spPr>
           <a:xfrm>
-            <a:off x="293454" y="248023"/>
-            <a:ext cx="1930857" cy="1055529"/>
+            <a:off x="293456" y="253712"/>
+            <a:ext cx="1930857" cy="1079738"/>
           </a:xfrm>
         </p:spPr>
         <p:txBody>
@@ -2541,8 +2541,8 @@
         </p:nvSpPr>
         <p:spPr>
           <a:xfrm>
-            <a:off x="2294612" y="248023"/>
-            <a:ext cx="3280928" cy="5316579"/>
+            <a:off x="2294612" y="253712"/>
+            <a:ext cx="3280928" cy="5438519"/>
           </a:xfrm>
         </p:spPr>
         <p:txBody>
@@ -2626,8 +2626,8 @@
         </p:nvSpPr>
         <p:spPr>
           <a:xfrm>
-            <a:off x="293454" y="1303553"/>
-            <a:ext cx="1930857" cy="4261048"/>
+            <a:off x="293456" y="1333452"/>
+            <a:ext cx="1930857" cy="4358778"/>
           </a:xfrm>
         </p:spPr>
         <p:txBody>
@@ -2696,7 +2696,7 @@
           <a:p>
             <a:fld id="{252CF840-51FB-49D9-ADDC-0C52DA34DC77}" type="datetimeFigureOut">
               <a:rPr lang="en-US" smtClean="0"/>
-              <a:t>7/11/2017</a:t>
+              <a:t>7/12/2017</a:t>
             </a:fld>
             <a:endParaRPr lang="en-US"/>
           </a:p>
@@ -2786,8 +2786,8 @@
         </p:nvSpPr>
         <p:spPr>
           <a:xfrm>
-            <a:off x="1150367" y="4360550"/>
-            <a:ext cx="3521393" cy="514786"/>
+            <a:off x="1150369" y="4460563"/>
+            <a:ext cx="3521393" cy="526593"/>
           </a:xfrm>
         </p:spPr>
         <p:txBody>
@@ -2818,8 +2818,8 @@
         </p:nvSpPr>
         <p:spPr>
           <a:xfrm>
-            <a:off x="1150367" y="556605"/>
-            <a:ext cx="3521393" cy="3737610"/>
+            <a:off x="1150369" y="569372"/>
+            <a:ext cx="3521393" cy="3823335"/>
           </a:xfrm>
         </p:spPr>
         <p:txBody>
@@ -2879,8 +2879,8 @@
         </p:nvSpPr>
         <p:spPr>
           <a:xfrm>
-            <a:off x="1150367" y="4875337"/>
-            <a:ext cx="3521393" cy="731083"/>
+            <a:off x="1150369" y="4987157"/>
+            <a:ext cx="3521393" cy="747851"/>
           </a:xfrm>
         </p:spPr>
         <p:txBody>
@@ -2949,7 +2949,7 @@
           <a:p>
             <a:fld id="{252CF840-51FB-49D9-ADDC-0C52DA34DC77}" type="datetimeFigureOut">
               <a:rPr lang="en-US" smtClean="0"/>
-              <a:t>7/11/2017</a:t>
+              <a:t>7/12/2017</a:t>
             </a:fld>
             <a:endParaRPr lang="en-US"/>
           </a:p>
@@ -3044,8 +3044,8 @@
         </p:nvSpPr>
         <p:spPr>
           <a:xfrm>
-            <a:off x="293453" y="249464"/>
-            <a:ext cx="5282089" cy="1038226"/>
+            <a:off x="293455" y="255186"/>
+            <a:ext cx="5282089" cy="1062038"/>
           </a:xfrm>
           <a:prstGeom prst="rect">
             <a:avLst/>
@@ -3077,8 +3077,8 @@
         </p:nvSpPr>
         <p:spPr>
           <a:xfrm>
-            <a:off x="293453" y="1453521"/>
-            <a:ext cx="5282089" cy="4111083"/>
+            <a:off x="293455" y="1486860"/>
+            <a:ext cx="5282089" cy="4205374"/>
           </a:xfrm>
           <a:prstGeom prst="rect">
             <a:avLst/>
@@ -3139,8 +3139,8 @@
         </p:nvSpPr>
         <p:spPr>
           <a:xfrm>
-            <a:off x="293454" y="5773689"/>
-            <a:ext cx="1369431" cy="331656"/>
+            <a:off x="293454" y="5906113"/>
+            <a:ext cx="1369431" cy="339263"/>
           </a:xfrm>
           <a:prstGeom prst="rect">
             <a:avLst/>
@@ -3162,7 +3162,7 @@
           <a:p>
             <a:fld id="{252CF840-51FB-49D9-ADDC-0C52DA34DC77}" type="datetimeFigureOut">
               <a:rPr lang="en-US" smtClean="0"/>
-              <a:t>7/11/2017</a:t>
+              <a:t>7/12/2017</a:t>
             </a:fld>
             <a:endParaRPr lang="en-US"/>
           </a:p>
@@ -3180,8 +3180,8 @@
         </p:nvSpPr>
         <p:spPr>
           <a:xfrm>
-            <a:off x="2005239" y="5773689"/>
-            <a:ext cx="1858512" cy="331656"/>
+            <a:off x="2005239" y="5906113"/>
+            <a:ext cx="1858512" cy="339263"/>
           </a:xfrm>
           <a:prstGeom prst="rect">
             <a:avLst/>
@@ -3217,8 +3217,8 @@
         </p:nvSpPr>
         <p:spPr>
           <a:xfrm>
-            <a:off x="4206111" y="5773689"/>
-            <a:ext cx="1369431" cy="331656"/>
+            <a:off x="4206113" y="5906113"/>
+            <a:ext cx="1369431" cy="339263"/>
           </a:xfrm>
           <a:prstGeom prst="rect">
             <a:avLst/>
@@ -3539,13 +3539,13 @@
       </p:grpSpPr>
       <p:sp>
         <p:nvSpPr>
-          <p:cNvPr id="45" name="ZoneTexte 44"/>
+          <p:cNvPr id="14" name="ZoneTexte 13"/>
           <p:cNvSpPr txBox="1"/>
           <p:nvPr/>
         </p:nvSpPr>
         <p:spPr>
           <a:xfrm>
-            <a:off x="146967" y="4881342"/>
+            <a:off x="146967" y="5008193"/>
             <a:ext cx="388209" cy="325012"/>
           </a:xfrm>
           <a:prstGeom prst="rect">
@@ -3575,7 +3575,7 @@
       </p:sp>
       <p:pic>
         <p:nvPicPr>
-          <p:cNvPr id="46" name="Picture 2"/>
+          <p:cNvPr id="15" name="Picture 2"/>
           <p:cNvPicPr>
             <a:picLocks noChangeAspect="1" noChangeArrowheads="1"/>
           </p:cNvPicPr>
@@ -3594,7 +3594,7 @@
         </p:blipFill>
         <p:spPr bwMode="auto">
           <a:xfrm>
-            <a:off x="112937" y="66675"/>
+            <a:off x="112937" y="193526"/>
             <a:ext cx="5927166" cy="2165102"/>
           </a:xfrm>
           <a:prstGeom prst="rect">
@@ -3627,13 +3627,13 @@
       </p:pic>
       <p:sp>
         <p:nvSpPr>
-          <p:cNvPr id="47" name="ZoneTexte 46"/>
+          <p:cNvPr id="16" name="ZoneTexte 15"/>
           <p:cNvSpPr txBox="1"/>
           <p:nvPr/>
         </p:nvSpPr>
         <p:spPr>
           <a:xfrm>
-            <a:off x="-82293" y="-1484"/>
+            <a:off x="-82293" y="125367"/>
             <a:ext cx="388209" cy="325012"/>
           </a:xfrm>
           <a:prstGeom prst="rect">
@@ -3663,7 +3663,7 @@
       </p:sp>
       <p:pic>
         <p:nvPicPr>
-          <p:cNvPr id="48" name="Picture 9"/>
+          <p:cNvPr id="17" name="Picture 9"/>
           <p:cNvPicPr>
             <a:picLocks noChangeAspect="1" noChangeArrowheads="1"/>
           </p:cNvPicPr>
@@ -3682,7 +3682,7 @@
         </p:blipFill>
         <p:spPr bwMode="auto">
           <a:xfrm>
-            <a:off x="83601" y="1874765"/>
+            <a:off x="83601" y="2001616"/>
             <a:ext cx="5982955" cy="4353419"/>
           </a:xfrm>
           <a:prstGeom prst="rect">
@@ -3715,13 +3715,13 @@
       </p:pic>
       <p:sp>
         <p:nvSpPr>
-          <p:cNvPr id="49" name="ZoneTexte 48"/>
+          <p:cNvPr id="18" name="ZoneTexte 17"/>
           <p:cNvSpPr txBox="1"/>
           <p:nvPr/>
         </p:nvSpPr>
         <p:spPr>
           <a:xfrm>
-            <a:off x="-54124" y="1835696"/>
+            <a:off x="-54124" y="1962547"/>
             <a:ext cx="399494" cy="325012"/>
           </a:xfrm>
           <a:prstGeom prst="rect">
@@ -3751,13 +3751,13 @@
       </p:sp>
       <p:sp>
         <p:nvSpPr>
-          <p:cNvPr id="50" name="ZoneTexte 49"/>
+          <p:cNvPr id="19" name="ZoneTexte 18"/>
           <p:cNvSpPr txBox="1"/>
           <p:nvPr/>
         </p:nvSpPr>
         <p:spPr>
           <a:xfrm>
-            <a:off x="4113455" y="2023730"/>
+            <a:off x="4113455" y="2150581"/>
             <a:ext cx="749333" cy="297928"/>
           </a:xfrm>
           <a:prstGeom prst="rect">
@@ -3782,6 +3782,188 @@
               <a:latin typeface="Times New Roman" panose="02020603050405020304" pitchFamily="18" charset="0"/>
               <a:cs typeface="Times New Roman" panose="02020603050405020304" pitchFamily="18" charset="0"/>
             </a:endParaRPr>
+          </a:p>
+        </p:txBody>
+      </p:sp>
+      <p:sp>
+        <p:nvSpPr>
+          <p:cNvPr id="20" name="ZoneTexte 19"/>
+          <p:cNvSpPr txBox="1"/>
+          <p:nvPr/>
+        </p:nvSpPr>
+        <p:spPr>
+          <a:xfrm>
+            <a:off x="1163031" y="-54248"/>
+            <a:ext cx="763351" cy="338554"/>
+          </a:xfrm>
+          <a:prstGeom prst="rect">
+            <a:avLst/>
+          </a:prstGeom>
+          <a:noFill/>
+        </p:spPr>
+        <p:txBody>
+          <a:bodyPr wrap="none" rtlCol="0">
+            <a:spAutoFit/>
+          </a:bodyPr>
+          <a:lstStyle/>
+          <a:p>
+            <a:r>
+              <a:rPr lang="fr-FR" sz="1600" dirty="0" smtClean="0">
+                <a:latin typeface="Times New Roman" panose="02020603050405020304" pitchFamily="18" charset="0"/>
+                <a:cs typeface="Times New Roman" panose="02020603050405020304" pitchFamily="18" charset="0"/>
+              </a:rPr>
+              <a:t>X</a:t>
+            </a:r>
+            <a:r>
+              <a:rPr lang="fr-FR" sz="1600" baseline="30000" dirty="0" smtClean="0">
+                <a:latin typeface="Times New Roman" panose="02020603050405020304" pitchFamily="18" charset="0"/>
+                <a:cs typeface="Times New Roman" panose="02020603050405020304" pitchFamily="18" charset="0"/>
+              </a:rPr>
+              <a:t>+</a:t>
+            </a:r>
+            <a:r>
+              <a:rPr lang="fr-FR" sz="1600" dirty="0" smtClean="0">
+                <a:latin typeface="Times New Roman" panose="02020603050405020304" pitchFamily="18" charset="0"/>
+                <a:cs typeface="Times New Roman" panose="02020603050405020304" pitchFamily="18" charset="0"/>
+              </a:rPr>
+              <a:t>-Mn</a:t>
+            </a:r>
+            <a:endParaRPr lang="en-US" sz="1600" dirty="0">
+              <a:latin typeface="Times New Roman" panose="02020603050405020304" pitchFamily="18" charset="0"/>
+              <a:cs typeface="Times New Roman" panose="02020603050405020304" pitchFamily="18" charset="0"/>
+            </a:endParaRPr>
+          </a:p>
+        </p:txBody>
+      </p:sp>
+      <p:sp>
+        <p:nvSpPr>
+          <p:cNvPr id="21" name="ZoneTexte 20"/>
+          <p:cNvSpPr txBox="1"/>
+          <p:nvPr/>
+        </p:nvSpPr>
+        <p:spPr>
+          <a:xfrm>
+            <a:off x="4302646" y="-54248"/>
+            <a:ext cx="686406" cy="338554"/>
+          </a:xfrm>
+          <a:prstGeom prst="rect">
+            <a:avLst/>
+          </a:prstGeom>
+          <a:noFill/>
+        </p:spPr>
+        <p:txBody>
+          <a:bodyPr wrap="none" rtlCol="0">
+            <a:spAutoFit/>
+          </a:bodyPr>
+          <a:lstStyle/>
+          <a:p>
+            <a:r>
+              <a:rPr lang="fr-FR" sz="1600" dirty="0" smtClean="0">
+                <a:latin typeface="Times New Roman" panose="02020603050405020304" pitchFamily="18" charset="0"/>
+                <a:cs typeface="Times New Roman" panose="02020603050405020304" pitchFamily="18" charset="0"/>
+              </a:rPr>
+              <a:t>X-Mn</a:t>
+            </a:r>
+            <a:endParaRPr lang="en-US" sz="1600" dirty="0">
+              <a:latin typeface="Times New Roman" panose="02020603050405020304" pitchFamily="18" charset="0"/>
+              <a:cs typeface="Times New Roman" panose="02020603050405020304" pitchFamily="18" charset="0"/>
+            </a:endParaRPr>
+          </a:p>
+        </p:txBody>
+      </p:sp>
+      <p:sp>
+        <p:nvSpPr>
+          <p:cNvPr id="2" name="Rectangle 1"/>
+          <p:cNvSpPr/>
+          <p:nvPr/>
+        </p:nvSpPr>
+        <p:spPr>
+          <a:xfrm>
+            <a:off x="1206302" y="5274344"/>
+            <a:ext cx="576064" cy="216024"/>
+          </a:xfrm>
+          <a:prstGeom prst="rect">
+            <a:avLst/>
+          </a:prstGeom>
+          <a:solidFill>
+            <a:schemeClr val="bg1"/>
+          </a:solidFill>
+          <a:ln>
+            <a:solidFill>
+              <a:schemeClr val="bg1"/>
+            </a:solidFill>
+          </a:ln>
+        </p:spPr>
+        <p:style>
+          <a:lnRef idx="2">
+            <a:schemeClr val="accent1">
+              <a:shade val="50000"/>
+            </a:schemeClr>
+          </a:lnRef>
+          <a:fillRef idx="1">
+            <a:schemeClr val="accent1"/>
+          </a:fillRef>
+          <a:effectRef idx="0">
+            <a:schemeClr val="accent1"/>
+          </a:effectRef>
+          <a:fontRef idx="minor">
+            <a:schemeClr val="lt1"/>
+          </a:fontRef>
+        </p:style>
+        <p:txBody>
+          <a:bodyPr rtlCol="0" anchor="ctr"/>
+          <a:lstStyle/>
+          <a:p>
+            <a:pPr algn="ctr"/>
+            <a:endParaRPr lang="fr-FR"/>
+          </a:p>
+        </p:txBody>
+      </p:sp>
+      <p:sp>
+        <p:nvSpPr>
+          <p:cNvPr id="11" name="Rectangle 10"/>
+          <p:cNvSpPr/>
+          <p:nvPr/>
+        </p:nvSpPr>
+        <p:spPr>
+          <a:xfrm>
+            <a:off x="4302646" y="5614924"/>
+            <a:ext cx="576064" cy="216024"/>
+          </a:xfrm>
+          <a:prstGeom prst="rect">
+            <a:avLst/>
+          </a:prstGeom>
+          <a:solidFill>
+            <a:schemeClr val="bg1"/>
+          </a:solidFill>
+          <a:ln>
+            <a:solidFill>
+              <a:schemeClr val="bg1"/>
+            </a:solidFill>
+          </a:ln>
+        </p:spPr>
+        <p:style>
+          <a:lnRef idx="2">
+            <a:schemeClr val="accent1">
+              <a:shade val="50000"/>
+            </a:schemeClr>
+          </a:lnRef>
+          <a:fillRef idx="1">
+            <a:schemeClr val="accent1"/>
+          </a:fillRef>
+          <a:effectRef idx="0">
+            <a:schemeClr val="accent1"/>
+          </a:effectRef>
+          <a:fontRef idx="minor">
+            <a:schemeClr val="lt1"/>
+          </a:fontRef>
+        </p:style>
+        <p:txBody>
+          <a:bodyPr rtlCol="0" anchor="ctr"/>
+          <a:lstStyle/>
+          <a:p>
+            <a:pPr algn="ctr"/>
+            <a:endParaRPr lang="fr-FR"/>
           </a:p>
         </p:txBody>
       </p:sp>

</xml_diff>